<commit_message>
added png files for all histograms, updated presentation with data analysis
</commit_message>
<xml_diff>
--- a/Solar_Panels.pptx
+++ b/Solar_Panels.pptx
@@ -9,8 +9,10 @@
     <p:sldId id="257" r:id="rId3"/>
     <p:sldId id="258" r:id="rId4"/>
     <p:sldId id="259" r:id="rId5"/>
-    <p:sldId id="260" r:id="rId6"/>
-    <p:sldId id="261" r:id="rId7"/>
+    <p:sldId id="262" r:id="rId6"/>
+    <p:sldId id="263" r:id="rId7"/>
+    <p:sldId id="260" r:id="rId8"/>
+    <p:sldId id="261" r:id="rId9"/>
   </p:sldIdLst>
   <p:sldSz cx="12192000" cy="6858000"/>
   <p:notesSz cx="6858000" cy="9144000"/>
@@ -109,6 +111,11 @@
       </a:defRPr>
     </a:lvl9pPr>
   </p:defaultTextStyle>
+  <p:extLst>
+    <p:ext uri="{EFAFB233-063F-42B5-8137-9DF3F51BA10A}">
+      <p15:sldGuideLst xmlns:p15="http://schemas.microsoft.com/office/powerpoint/2012/main"/>
+    </p:ext>
+  </p:extLst>
 </p:presentation>
 </file>
 
@@ -614,7 +621,7 @@
           <a:p>
             <a:fld id="{FC754BF3-C483-47DB-872A-FF9086C8AF2E}" type="datetimeFigureOut">
               <a:rPr lang="en-US" smtClean="0"/>
-              <a:t>1/17/2019</a:t>
+              <a:t>1/19/2019</a:t>
             </a:fld>
             <a:endParaRPr lang="en-US"/>
           </a:p>
@@ -910,7 +917,7 @@
           <a:p>
             <a:fld id="{FC754BF3-C483-47DB-872A-FF9086C8AF2E}" type="datetimeFigureOut">
               <a:rPr lang="en-US" smtClean="0"/>
-              <a:t>1/17/2019</a:t>
+              <a:t>1/19/2019</a:t>
             </a:fld>
             <a:endParaRPr lang="en-US"/>
           </a:p>
@@ -1158,7 +1165,7 @@
           <a:p>
             <a:fld id="{FC754BF3-C483-47DB-872A-FF9086C8AF2E}" type="datetimeFigureOut">
               <a:rPr lang="en-US" smtClean="0"/>
-              <a:t>1/17/2019</a:t>
+              <a:t>1/19/2019</a:t>
             </a:fld>
             <a:endParaRPr lang="en-US"/>
           </a:p>
@@ -1698,7 +1705,7 @@
           <a:p>
             <a:fld id="{FC754BF3-C483-47DB-872A-FF9086C8AF2E}" type="datetimeFigureOut">
               <a:rPr lang="en-US" smtClean="0"/>
-              <a:t>1/17/2019</a:t>
+              <a:t>1/19/2019</a:t>
             </a:fld>
             <a:endParaRPr lang="en-US"/>
           </a:p>
@@ -1946,7 +1953,7 @@
           <a:p>
             <a:fld id="{FC754BF3-C483-47DB-872A-FF9086C8AF2E}" type="datetimeFigureOut">
               <a:rPr lang="en-US" smtClean="0"/>
-              <a:t>1/17/2019</a:t>
+              <a:t>1/19/2019</a:t>
             </a:fld>
             <a:endParaRPr lang="en-US"/>
           </a:p>
@@ -2478,7 +2485,7 @@
           <a:p>
             <a:fld id="{FC754BF3-C483-47DB-872A-FF9086C8AF2E}" type="datetimeFigureOut">
               <a:rPr lang="en-US" smtClean="0"/>
-              <a:t>1/17/2019</a:t>
+              <a:t>1/19/2019</a:t>
             </a:fld>
             <a:endParaRPr lang="en-US"/>
           </a:p>
@@ -2775,7 +2782,7 @@
           <a:p>
             <a:fld id="{FC754BF3-C483-47DB-872A-FF9086C8AF2E}" type="datetimeFigureOut">
               <a:rPr lang="en-US" smtClean="0"/>
-              <a:t>1/17/2019</a:t>
+              <a:t>1/19/2019</a:t>
             </a:fld>
             <a:endParaRPr lang="en-US"/>
           </a:p>
@@ -2949,7 +2956,7 @@
           <a:p>
             <a:fld id="{FC754BF3-C483-47DB-872A-FF9086C8AF2E}" type="datetimeFigureOut">
               <a:rPr lang="en-US" smtClean="0"/>
-              <a:t>1/17/2019</a:t>
+              <a:t>1/19/2019</a:t>
             </a:fld>
             <a:endParaRPr lang="en-US"/>
           </a:p>
@@ -3129,7 +3136,7 @@
           <a:p>
             <a:fld id="{FC754BF3-C483-47DB-872A-FF9086C8AF2E}" type="datetimeFigureOut">
               <a:rPr lang="en-US" smtClean="0"/>
-              <a:t>1/17/2019</a:t>
+              <a:t>1/19/2019</a:t>
             </a:fld>
             <a:endParaRPr lang="en-US"/>
           </a:p>
@@ -3299,7 +3306,7 @@
           <a:p>
             <a:fld id="{FC754BF3-C483-47DB-872A-FF9086C8AF2E}" type="datetimeFigureOut">
               <a:rPr lang="en-US" smtClean="0"/>
-              <a:t>1/17/2019</a:t>
+              <a:t>1/19/2019</a:t>
             </a:fld>
             <a:endParaRPr lang="en-US"/>
           </a:p>
@@ -3550,7 +3557,7 @@
           <a:p>
             <a:fld id="{FC754BF3-C483-47DB-872A-FF9086C8AF2E}" type="datetimeFigureOut">
               <a:rPr lang="en-US" smtClean="0"/>
-              <a:t>1/17/2019</a:t>
+              <a:t>1/19/2019</a:t>
             </a:fld>
             <a:endParaRPr lang="en-US"/>
           </a:p>
@@ -3847,7 +3854,7 @@
           <a:p>
             <a:fld id="{FC754BF3-C483-47DB-872A-FF9086C8AF2E}" type="datetimeFigureOut">
               <a:rPr lang="en-US" smtClean="0"/>
-              <a:t>1/17/2019</a:t>
+              <a:t>1/19/2019</a:t>
             </a:fld>
             <a:endParaRPr lang="en-US"/>
           </a:p>
@@ -4289,7 +4296,7 @@
           <a:p>
             <a:fld id="{FC754BF3-C483-47DB-872A-FF9086C8AF2E}" type="datetimeFigureOut">
               <a:rPr lang="en-US" smtClean="0"/>
-              <a:t>1/17/2019</a:t>
+              <a:t>1/19/2019</a:t>
             </a:fld>
             <a:endParaRPr lang="en-US"/>
           </a:p>
@@ -4407,7 +4414,7 @@
           <a:p>
             <a:fld id="{FC754BF3-C483-47DB-872A-FF9086C8AF2E}" type="datetimeFigureOut">
               <a:rPr lang="en-US" smtClean="0"/>
-              <a:t>1/17/2019</a:t>
+              <a:t>1/19/2019</a:t>
             </a:fld>
             <a:endParaRPr lang="en-US"/>
           </a:p>
@@ -4502,7 +4509,7 @@
           <a:p>
             <a:fld id="{FC754BF3-C483-47DB-872A-FF9086C8AF2E}" type="datetimeFigureOut">
               <a:rPr lang="en-US" smtClean="0"/>
-              <a:t>1/17/2019</a:t>
+              <a:t>1/19/2019</a:t>
             </a:fld>
             <a:endParaRPr lang="en-US"/>
           </a:p>
@@ -4785,7 +4792,7 @@
           <a:p>
             <a:fld id="{FC754BF3-C483-47DB-872A-FF9086C8AF2E}" type="datetimeFigureOut">
               <a:rPr lang="en-US" smtClean="0"/>
-              <a:t>1/17/2019</a:t>
+              <a:t>1/19/2019</a:t>
             </a:fld>
             <a:endParaRPr lang="en-US"/>
           </a:p>
@@ -5076,7 +5083,7 @@
           <a:p>
             <a:fld id="{FC754BF3-C483-47DB-872A-FF9086C8AF2E}" type="datetimeFigureOut">
               <a:rPr lang="en-US" smtClean="0"/>
-              <a:t>1/17/2019</a:t>
+              <a:t>1/19/2019</a:t>
             </a:fld>
             <a:endParaRPr lang="en-US"/>
           </a:p>
@@ -5606,7 +5613,7 @@
           <a:p>
             <a:fld id="{FC754BF3-C483-47DB-872A-FF9086C8AF2E}" type="datetimeFigureOut">
               <a:rPr lang="en-US" smtClean="0"/>
-              <a:t>1/17/2019</a:t>
+              <a:t>1/19/2019</a:t>
             </a:fld>
             <a:endParaRPr lang="en-US"/>
           </a:p>
@@ -6640,12 +6647,104 @@
             <p:ph idx="1"/>
           </p:nvPr>
         </p:nvSpPr>
-        <p:spPr/>
-        <p:txBody>
-          <a:bodyPr/>
+        <p:spPr>
+          <a:xfrm>
+            <a:off x="1283694" y="834501"/>
+            <a:ext cx="10018713" cy="5663953"/>
+          </a:xfrm>
+        </p:spPr>
+        <p:txBody>
+          <a:bodyPr>
+            <a:normAutofit/>
+          </a:bodyPr>
           <a:lstStyle/>
           <a:p>
-            <a:endParaRPr lang="en-US"/>
+            <a:r>
+              <a:rPr lang="en-US" dirty="0"/>
+              <a:t>Test for significance – what matters for solar panel adoption?</a:t>
+            </a:r>
+          </a:p>
+          <a:p>
+            <a:pPr lvl="1"/>
+            <a:r>
+              <a:rPr lang="en-US" dirty="0"/>
+              <a:t>Organize </a:t>
+            </a:r>
+            <a:r>
+              <a:rPr lang="en-US" dirty="0" err="1"/>
+              <a:t>dataframe</a:t>
+            </a:r>
+            <a:r>
+              <a:rPr lang="en-US" dirty="0"/>
+              <a:t> into those with solar (49940) and those without solar (13907)</a:t>
+            </a:r>
+          </a:p>
+          <a:p>
+            <a:pPr lvl="1"/>
+            <a:r>
+              <a:rPr lang="en-US" dirty="0"/>
+              <a:t>Sample 1000 datapoints from each subset</a:t>
+            </a:r>
+          </a:p>
+          <a:p>
+            <a:pPr lvl="1"/>
+            <a:r>
+              <a:rPr lang="en-US" dirty="0"/>
+              <a:t>Create function to calculate variable mean, create histogram, and test for significance</a:t>
+            </a:r>
+          </a:p>
+          <a:p>
+            <a:pPr lvl="2"/>
+            <a:r>
+              <a:rPr lang="en-US" dirty="0"/>
+              <a:t>Per capita income</a:t>
+            </a:r>
+          </a:p>
+          <a:p>
+            <a:pPr lvl="2"/>
+            <a:r>
+              <a:rPr lang="en-US" dirty="0"/>
+              <a:t>Daily solar radiation</a:t>
+            </a:r>
+          </a:p>
+          <a:p>
+            <a:pPr lvl="2"/>
+            <a:r>
+              <a:rPr lang="en-US" dirty="0"/>
+              <a:t>Incentive Count</a:t>
+            </a:r>
+          </a:p>
+          <a:p>
+            <a:pPr lvl="2"/>
+            <a:r>
+              <a:rPr lang="en-US" dirty="0"/>
+              <a:t>Electricity Price</a:t>
+            </a:r>
+          </a:p>
+          <a:p>
+            <a:pPr lvl="2"/>
+            <a:r>
+              <a:rPr lang="en-US" dirty="0"/>
+              <a:t>Number of years of education</a:t>
+            </a:r>
+          </a:p>
+          <a:p>
+            <a:pPr lvl="2"/>
+            <a:r>
+              <a:rPr lang="en-US" dirty="0"/>
+              <a:t>Voting percentage of democrats in 2016</a:t>
+            </a:r>
+          </a:p>
+          <a:p>
+            <a:pPr lvl="1"/>
+            <a:r>
+              <a:rPr lang="en-US" dirty="0"/>
+              <a:t>Can only test for significance, not causality</a:t>
+            </a:r>
+          </a:p>
+          <a:p>
+            <a:pPr lvl="1"/>
+            <a:endParaRPr lang="en-US" dirty="0"/>
           </a:p>
         </p:txBody>
       </p:sp>
@@ -6709,6 +6808,444 @@
           <a:p>
             <a:r>
               <a:rPr lang="en-US" sz="3500" dirty="0"/>
+              <a:t>Histograms - examples</a:t>
+            </a:r>
+          </a:p>
+        </p:txBody>
+      </p:sp>
+      <p:pic>
+        <p:nvPicPr>
+          <p:cNvPr id="7" name="Picture 6">
+            <a:extLst>
+              <a:ext uri="{FF2B5EF4-FFF2-40B4-BE49-F238E27FC236}">
+                <a16:creationId xmlns:a16="http://schemas.microsoft.com/office/drawing/2014/main" id="{0951C0A6-DD75-40FD-B169-A349235BB3F8}"/>
+              </a:ext>
+            </a:extLst>
+          </p:cNvPr>
+          <p:cNvPicPr>
+            <a:picLocks noChangeAspect="1"/>
+          </p:cNvPicPr>
+          <p:nvPr/>
+        </p:nvPicPr>
+        <p:blipFill>
+          <a:blip r:embed="rId2">
+            <a:extLst>
+              <a:ext uri="{28A0092B-C50C-407E-A947-70E740481C1C}">
+                <a14:useLocalDpi xmlns:a14="http://schemas.microsoft.com/office/drawing/2010/main" val="0"/>
+              </a:ext>
+            </a:extLst>
+          </a:blip>
+          <a:stretch>
+            <a:fillRect/>
+          </a:stretch>
+        </p:blipFill>
+        <p:spPr>
+          <a:xfrm>
+            <a:off x="88700" y="745725"/>
+            <a:ext cx="6007300" cy="2534514"/>
+          </a:xfrm>
+          <a:prstGeom prst="rect">
+            <a:avLst/>
+          </a:prstGeom>
+        </p:spPr>
+      </p:pic>
+      <p:pic>
+        <p:nvPicPr>
+          <p:cNvPr id="9" name="Picture 8">
+            <a:extLst>
+              <a:ext uri="{FF2B5EF4-FFF2-40B4-BE49-F238E27FC236}">
+                <a16:creationId xmlns:a16="http://schemas.microsoft.com/office/drawing/2014/main" id="{0B655BFD-2CFF-4474-B52F-A35FBB44D643}"/>
+              </a:ext>
+            </a:extLst>
+          </p:cNvPr>
+          <p:cNvPicPr>
+            <a:picLocks noChangeAspect="1"/>
+          </p:cNvPicPr>
+          <p:nvPr/>
+        </p:nvPicPr>
+        <p:blipFill>
+          <a:blip r:embed="rId3">
+            <a:extLst>
+              <a:ext uri="{28A0092B-C50C-407E-A947-70E740481C1C}">
+                <a14:useLocalDpi xmlns:a14="http://schemas.microsoft.com/office/drawing/2010/main" val="0"/>
+              </a:ext>
+            </a:extLst>
+          </a:blip>
+          <a:stretch>
+            <a:fillRect/>
+          </a:stretch>
+        </p:blipFill>
+        <p:spPr>
+          <a:xfrm>
+            <a:off x="88700" y="3429000"/>
+            <a:ext cx="6007300" cy="2534515"/>
+          </a:xfrm>
+          <a:prstGeom prst="rect">
+            <a:avLst/>
+          </a:prstGeom>
+        </p:spPr>
+      </p:pic>
+      <p:pic>
+        <p:nvPicPr>
+          <p:cNvPr id="11" name="Picture 10">
+            <a:extLst>
+              <a:ext uri="{FF2B5EF4-FFF2-40B4-BE49-F238E27FC236}">
+                <a16:creationId xmlns:a16="http://schemas.microsoft.com/office/drawing/2014/main" id="{AFC82A72-C4AC-4F88-88F1-F14EFCF151C5}"/>
+              </a:ext>
+            </a:extLst>
+          </p:cNvPr>
+          <p:cNvPicPr>
+            <a:picLocks noChangeAspect="1"/>
+          </p:cNvPicPr>
+          <p:nvPr/>
+        </p:nvPicPr>
+        <p:blipFill>
+          <a:blip r:embed="rId4">
+            <a:extLst>
+              <a:ext uri="{28A0092B-C50C-407E-A947-70E740481C1C}">
+                <a14:useLocalDpi xmlns:a14="http://schemas.microsoft.com/office/drawing/2010/main" val="0"/>
+              </a:ext>
+            </a:extLst>
+          </a:blip>
+          <a:stretch>
+            <a:fillRect/>
+          </a:stretch>
+        </p:blipFill>
+        <p:spPr>
+          <a:xfrm>
+            <a:off x="6184701" y="745725"/>
+            <a:ext cx="5918600" cy="2534514"/>
+          </a:xfrm>
+          <a:prstGeom prst="rect">
+            <a:avLst/>
+          </a:prstGeom>
+        </p:spPr>
+      </p:pic>
+      <p:pic>
+        <p:nvPicPr>
+          <p:cNvPr id="13" name="Picture 12">
+            <a:extLst>
+              <a:ext uri="{FF2B5EF4-FFF2-40B4-BE49-F238E27FC236}">
+                <a16:creationId xmlns:a16="http://schemas.microsoft.com/office/drawing/2014/main" id="{51324816-9767-425A-9E83-1E886C0CC08C}"/>
+              </a:ext>
+            </a:extLst>
+          </p:cNvPr>
+          <p:cNvPicPr>
+            <a:picLocks noChangeAspect="1"/>
+          </p:cNvPicPr>
+          <p:nvPr/>
+        </p:nvPicPr>
+        <p:blipFill>
+          <a:blip r:embed="rId5">
+            <a:extLst>
+              <a:ext uri="{28A0092B-C50C-407E-A947-70E740481C1C}">
+                <a14:useLocalDpi xmlns:a14="http://schemas.microsoft.com/office/drawing/2010/main" val="0"/>
+              </a:ext>
+            </a:extLst>
+          </a:blip>
+          <a:stretch>
+            <a:fillRect/>
+          </a:stretch>
+        </p:blipFill>
+        <p:spPr>
+          <a:xfrm>
+            <a:off x="6184698" y="3429001"/>
+            <a:ext cx="5918601" cy="2534514"/>
+          </a:xfrm>
+          <a:prstGeom prst="rect">
+            <a:avLst/>
+          </a:prstGeom>
+        </p:spPr>
+      </p:pic>
+    </p:spTree>
+    <p:extLst>
+      <p:ext uri="{BB962C8B-B14F-4D97-AF65-F5344CB8AC3E}">
+        <p14:creationId xmlns:p14="http://schemas.microsoft.com/office/powerpoint/2010/main" val="1678498864"/>
+      </p:ext>
+    </p:extLst>
+  </p:cSld>
+  <p:clrMapOvr>
+    <a:masterClrMapping/>
+  </p:clrMapOvr>
+</p:sld>
+</file>
+
+<file path=ppt/slides/slide6.xml><?xml version="1.0" encoding="utf-8"?>
+<p:sld xmlns:a="http://schemas.openxmlformats.org/drawingml/2006/main" xmlns:r="http://schemas.openxmlformats.org/officeDocument/2006/relationships" xmlns:p="http://schemas.openxmlformats.org/presentationml/2006/main">
+  <p:cSld>
+    <p:spTree>
+      <p:nvGrpSpPr>
+        <p:cNvPr id="1" name=""/>
+        <p:cNvGrpSpPr/>
+        <p:nvPr/>
+      </p:nvGrpSpPr>
+      <p:grpSpPr>
+        <a:xfrm>
+          <a:off x="0" y="0"/>
+          <a:ext cx="0" cy="0"/>
+          <a:chOff x="0" y="0"/>
+          <a:chExt cx="0" cy="0"/>
+        </a:xfrm>
+      </p:grpSpPr>
+      <p:sp>
+        <p:nvSpPr>
+          <p:cNvPr id="2" name="Title 1">
+            <a:extLst>
+              <a:ext uri="{FF2B5EF4-FFF2-40B4-BE49-F238E27FC236}">
+                <a16:creationId xmlns:a16="http://schemas.microsoft.com/office/drawing/2014/main" id="{C423F6A6-207A-4FEE-B959-191516A75905}"/>
+              </a:ext>
+            </a:extLst>
+          </p:cNvPr>
+          <p:cNvSpPr>
+            <a:spLocks noGrp="1"/>
+          </p:cNvSpPr>
+          <p:nvPr>
+            <p:ph type="title"/>
+          </p:nvPr>
+        </p:nvSpPr>
+        <p:spPr>
+          <a:xfrm>
+            <a:off x="790115" y="0"/>
+            <a:ext cx="11005872" cy="745724"/>
+          </a:xfrm>
+        </p:spPr>
+        <p:txBody>
+          <a:bodyPr>
+            <a:normAutofit/>
+          </a:bodyPr>
+          <a:lstStyle/>
+          <a:p>
+            <a:r>
+              <a:rPr lang="en-US" sz="3500" dirty="0"/>
+              <a:t>Map Visualization</a:t>
+            </a:r>
+          </a:p>
+        </p:txBody>
+      </p:sp>
+      <p:sp>
+        <p:nvSpPr>
+          <p:cNvPr id="5" name="Content Placeholder 4">
+            <a:extLst>
+              <a:ext uri="{FF2B5EF4-FFF2-40B4-BE49-F238E27FC236}">
+                <a16:creationId xmlns:a16="http://schemas.microsoft.com/office/drawing/2014/main" id="{CA041A0B-3858-47E9-99E2-D837C5A4F4E4}"/>
+              </a:ext>
+            </a:extLst>
+          </p:cNvPr>
+          <p:cNvSpPr>
+            <a:spLocks noGrp="1"/>
+          </p:cNvSpPr>
+          <p:nvPr>
+            <p:ph idx="1"/>
+          </p:nvPr>
+        </p:nvSpPr>
+        <p:spPr>
+          <a:xfrm>
+            <a:off x="1383172" y="542648"/>
+            <a:ext cx="10018713" cy="2133877"/>
+          </a:xfrm>
+        </p:spPr>
+        <p:txBody>
+          <a:bodyPr>
+            <a:normAutofit/>
+          </a:bodyPr>
+          <a:lstStyle/>
+          <a:p>
+            <a:r>
+              <a:rPr lang="en-US" sz="1800" dirty="0"/>
+              <a:t>Merge two </a:t>
+            </a:r>
+            <a:r>
+              <a:rPr lang="en-US" sz="1800" dirty="0" err="1"/>
+              <a:t>dataframes</a:t>
+            </a:r>
+            <a:r>
+              <a:rPr lang="en-US" sz="1800" dirty="0"/>
+              <a:t> by county and state: coordinate data + demographic data</a:t>
+            </a:r>
+          </a:p>
+          <a:p>
+            <a:r>
+              <a:rPr lang="en-US" sz="1800" dirty="0" err="1"/>
+              <a:t>Gmaps.figure</a:t>
+            </a:r>
+            <a:r>
+              <a:rPr lang="en-US" sz="1800" dirty="0"/>
+              <a:t>() to create:</a:t>
+            </a:r>
+          </a:p>
+          <a:p>
+            <a:pPr lvl="1"/>
+            <a:r>
+              <a:rPr lang="en-US" sz="1800" dirty="0" err="1"/>
+              <a:t>Heat_layer</a:t>
+            </a:r>
+            <a:r>
+              <a:rPr lang="en-US" sz="1800" dirty="0"/>
+              <a:t> = independent variable (daily solar radiation, electricity prices, </a:t>
+            </a:r>
+            <a:r>
+              <a:rPr lang="en-US" sz="1800" dirty="0" err="1"/>
+              <a:t>etc</a:t>
+            </a:r>
+            <a:r>
+              <a:rPr lang="en-US" sz="1800" dirty="0"/>
+              <a:t>)</a:t>
+            </a:r>
+          </a:p>
+          <a:p>
+            <a:pPr lvl="1"/>
+            <a:r>
+              <a:rPr lang="en-US" sz="1800" dirty="0" err="1"/>
+              <a:t>Symbol_layer</a:t>
+            </a:r>
+            <a:r>
+              <a:rPr lang="en-US" sz="1800" dirty="0"/>
+              <a:t> = target variable (solar systems per person)</a:t>
+            </a:r>
+          </a:p>
+          <a:p>
+            <a:pPr lvl="1"/>
+            <a:endParaRPr lang="en-US" sz="1800" dirty="0"/>
+          </a:p>
+        </p:txBody>
+      </p:sp>
+      <p:pic>
+        <p:nvPicPr>
+          <p:cNvPr id="4" name="Picture 3">
+            <a:extLst>
+              <a:ext uri="{FF2B5EF4-FFF2-40B4-BE49-F238E27FC236}">
+                <a16:creationId xmlns:a16="http://schemas.microsoft.com/office/drawing/2014/main" id="{197E8C19-5EC9-4773-A8E0-05C5471824DC}"/>
+              </a:ext>
+            </a:extLst>
+          </p:cNvPr>
+          <p:cNvPicPr>
+            <a:picLocks noChangeAspect="1"/>
+          </p:cNvPicPr>
+          <p:nvPr/>
+        </p:nvPicPr>
+        <p:blipFill>
+          <a:blip r:embed="rId2">
+            <a:extLst>
+              <a:ext uri="{28A0092B-C50C-407E-A947-70E740481C1C}">
+                <a14:useLocalDpi xmlns:a14="http://schemas.microsoft.com/office/drawing/2010/main" val="0"/>
+              </a:ext>
+            </a:extLst>
+          </a:blip>
+          <a:stretch>
+            <a:fillRect/>
+          </a:stretch>
+        </p:blipFill>
+        <p:spPr>
+          <a:xfrm>
+            <a:off x="790115" y="2438401"/>
+            <a:ext cx="10523078" cy="4305300"/>
+          </a:xfrm>
+          <a:prstGeom prst="rect">
+            <a:avLst/>
+          </a:prstGeom>
+        </p:spPr>
+      </p:pic>
+      <p:sp>
+        <p:nvSpPr>
+          <p:cNvPr id="6" name="TextBox 5">
+            <a:extLst>
+              <a:ext uri="{FF2B5EF4-FFF2-40B4-BE49-F238E27FC236}">
+                <a16:creationId xmlns:a16="http://schemas.microsoft.com/office/drawing/2014/main" id="{69F349A7-B5DA-4B4A-9AB9-DF283F0A5462}"/>
+              </a:ext>
+            </a:extLst>
+          </p:cNvPr>
+          <p:cNvSpPr txBox="1"/>
+          <p:nvPr/>
+        </p:nvSpPr>
+        <p:spPr>
+          <a:xfrm>
+            <a:off x="7907852" y="5495649"/>
+            <a:ext cx="3494033" cy="646331"/>
+          </a:xfrm>
+          <a:prstGeom prst="rect">
+            <a:avLst/>
+          </a:prstGeom>
+          <a:noFill/>
+        </p:spPr>
+        <p:txBody>
+          <a:bodyPr wrap="none" rtlCol="0">
+            <a:spAutoFit/>
+          </a:bodyPr>
+          <a:lstStyle/>
+          <a:p>
+            <a:r>
+              <a:rPr lang="en-US" dirty="0"/>
+              <a:t>Daily Radiation = heatmap</a:t>
+            </a:r>
+          </a:p>
+          <a:p>
+            <a:r>
+              <a:rPr lang="en-US" dirty="0"/>
+              <a:t>Solar Systems per person = symbol</a:t>
+            </a:r>
+          </a:p>
+        </p:txBody>
+      </p:sp>
+    </p:spTree>
+    <p:extLst>
+      <p:ext uri="{BB962C8B-B14F-4D97-AF65-F5344CB8AC3E}">
+        <p14:creationId xmlns:p14="http://schemas.microsoft.com/office/powerpoint/2010/main" val="1544293373"/>
+      </p:ext>
+    </p:extLst>
+  </p:cSld>
+  <p:clrMapOvr>
+    <a:masterClrMapping/>
+  </p:clrMapOvr>
+</p:sld>
+</file>
+
+<file path=ppt/slides/slide7.xml><?xml version="1.0" encoding="utf-8"?>
+<p:sld xmlns:a="http://schemas.openxmlformats.org/drawingml/2006/main" xmlns:r="http://schemas.openxmlformats.org/officeDocument/2006/relationships" xmlns:p="http://schemas.openxmlformats.org/presentationml/2006/main">
+  <p:cSld>
+    <p:spTree>
+      <p:nvGrpSpPr>
+        <p:cNvPr id="1" name=""/>
+        <p:cNvGrpSpPr/>
+        <p:nvPr/>
+      </p:nvGrpSpPr>
+      <p:grpSpPr>
+        <a:xfrm>
+          <a:off x="0" y="0"/>
+          <a:ext cx="0" cy="0"/>
+          <a:chOff x="0" y="0"/>
+          <a:chExt cx="0" cy="0"/>
+        </a:xfrm>
+      </p:grpSpPr>
+      <p:sp>
+        <p:nvSpPr>
+          <p:cNvPr id="2" name="Title 1">
+            <a:extLst>
+              <a:ext uri="{FF2B5EF4-FFF2-40B4-BE49-F238E27FC236}">
+                <a16:creationId xmlns:a16="http://schemas.microsoft.com/office/drawing/2014/main" id="{C423F6A6-207A-4FEE-B959-191516A75905}"/>
+              </a:ext>
+            </a:extLst>
+          </p:cNvPr>
+          <p:cNvSpPr>
+            <a:spLocks noGrp="1"/>
+          </p:cNvSpPr>
+          <p:nvPr>
+            <p:ph type="title"/>
+          </p:nvPr>
+        </p:nvSpPr>
+        <p:spPr>
+          <a:xfrm>
+            <a:off x="790115" y="0"/>
+            <a:ext cx="11005872" cy="745724"/>
+          </a:xfrm>
+        </p:spPr>
+        <p:txBody>
+          <a:bodyPr>
+            <a:normAutofit/>
+          </a:bodyPr>
+          <a:lstStyle/>
+          <a:p>
+            <a:r>
+              <a:rPr lang="en-US" sz="3500" dirty="0"/>
               <a:t>Discussion</a:t>
             </a:r>
           </a:p>
@@ -6752,7 +7289,7 @@
 </p:sld>
 </file>
 
-<file path=ppt/slides/slide6.xml><?xml version="1.0" encoding="utf-8"?>
+<file path=ppt/slides/slide8.xml><?xml version="1.0" encoding="utf-8"?>
 <p:sld xmlns:a="http://schemas.openxmlformats.org/drawingml/2006/main" xmlns:r="http://schemas.openxmlformats.org/officeDocument/2006/relationships" xmlns:p="http://schemas.openxmlformats.org/presentationml/2006/main">
   <p:cSld>
     <p:spTree>

</xml_diff>